<commit_message>
CU + ST + Soutenance
Modification des cas d'utilisations, création des powerpoint pour la solution technique et la soutenance
</commit_message>
<xml_diff>
--- a/Solution Technique/Solution Technique - OCPizza.pptx
+++ b/Solution Technique/Solution Technique - OCPizza.pptx
@@ -3339,12 +3339,12 @@
               <a:t>Un </a:t>
             </a:r>
             <a:r>
-              <a:rPr lang="fr-FR" dirty="0" err="1" smtClean="0"/>
-              <a:t>développemnt</a:t>
-            </a:r>
-            <a:r>
               <a:rPr lang="fr-FR" dirty="0" smtClean="0"/>
-              <a:t> « </a:t>
+              <a:t>développement </a:t>
+            </a:r>
+            <a:r>
+              <a:rPr lang="fr-FR" dirty="0" smtClean="0"/>
+              <a:t>« </a:t>
             </a:r>
             <a:r>
               <a:rPr lang="fr-FR" dirty="0" err="1" smtClean="0"/>
@@ -3905,8 +3905,13 @@
           <a:p>
             <a:r>
               <a:rPr lang="fr-FR" sz="2800" dirty="0" smtClean="0"/>
-              <a:t>Ce mode sera utilisé par les Clients</a:t>
-            </a:r>
+              <a:t>Ce mode sera utilisé par les </a:t>
+            </a:r>
+            <a:r>
+              <a:rPr lang="fr-FR" sz="2800" dirty="0" smtClean="0"/>
+              <a:t>Clients et Administration</a:t>
+            </a:r>
+            <a:endParaRPr lang="fr-FR" sz="2800" dirty="0" smtClean="0"/>
           </a:p>
           <a:p>
             <a:endParaRPr lang="fr-FR" sz="2800" dirty="0" smtClean="0"/>
@@ -4090,8 +4095,13 @@
           <a:p>
             <a:r>
               <a:rPr lang="fr-FR" sz="2800" dirty="0" smtClean="0"/>
-              <a:t>Ce serveur permettra de mettre en place la plateforme de commande en ligne</a:t>
-            </a:r>
+              <a:t>Ce serveur permettra de mettre en place la plateforme de commande en </a:t>
+            </a:r>
+            <a:r>
+              <a:rPr lang="fr-FR" sz="2800" dirty="0" smtClean="0"/>
+              <a:t>ligne et de communiquer avec la  base de donnée</a:t>
+            </a:r>
+            <a:endParaRPr lang="fr-FR" sz="2800" dirty="0" smtClean="0"/>
           </a:p>
           <a:p>
             <a:endParaRPr lang="fr-FR" sz="2800" dirty="0" smtClean="0"/>

</xml_diff>